<commit_message>
updated lectures and lab
</commit_message>
<xml_diff>
--- a/Lectures/Lecture 10 - Features.pptx
+++ b/Lectures/Lecture 10 - Features.pptx
@@ -12,16 +12,16 @@
     <p:sldId id="276" r:id="rId3"/>
     <p:sldId id="273" r:id="rId4"/>
     <p:sldId id="274" r:id="rId5"/>
-    <p:sldId id="281" r:id="rId6"/>
-    <p:sldId id="300" r:id="rId7"/>
-    <p:sldId id="301" r:id="rId8"/>
-    <p:sldId id="302" r:id="rId9"/>
-    <p:sldId id="303" r:id="rId10"/>
-    <p:sldId id="304" r:id="rId11"/>
-    <p:sldId id="277" r:id="rId12"/>
-    <p:sldId id="278" r:id="rId13"/>
-    <p:sldId id="280" r:id="rId14"/>
-    <p:sldId id="279" r:id="rId15"/>
+    <p:sldId id="300" r:id="rId6"/>
+    <p:sldId id="301" r:id="rId7"/>
+    <p:sldId id="302" r:id="rId8"/>
+    <p:sldId id="303" r:id="rId9"/>
+    <p:sldId id="304" r:id="rId10"/>
+    <p:sldId id="277" r:id="rId11"/>
+    <p:sldId id="278" r:id="rId12"/>
+    <p:sldId id="280" r:id="rId13"/>
+    <p:sldId id="279" r:id="rId14"/>
+    <p:sldId id="306" r:id="rId15"/>
     <p:sldId id="283" r:id="rId16"/>
     <p:sldId id="286" r:id="rId17"/>
     <p:sldId id="287" r:id="rId18"/>
@@ -3360,7 +3360,7 @@
           <a:p>
             <a:fld id="{9B69B9FF-71BF-6149-A0CB-459184DAAD9F}" type="datetimeFigureOut">
               <a:rPr lang="en-US" smtClean="0"/>
-              <a:t>4/26/17</a:t>
+              <a:t>5/11/17</a:t>
             </a:fld>
             <a:endParaRPr lang="en-US"/>
           </a:p>
@@ -4125,7 +4125,7 @@
           <a:p>
             <a:fld id="{7C0312F8-2DE2-6B40-83C5-731724CAE2B0}" type="datetimeFigureOut">
               <a:rPr lang="en-US" smtClean="0"/>
-              <a:t>4/26/17</a:t>
+              <a:t>5/11/17</a:t>
             </a:fld>
             <a:endParaRPr lang="en-US"/>
           </a:p>
@@ -4305,7 +4305,7 @@
           <a:p>
             <a:fld id="{7C0312F8-2DE2-6B40-83C5-731724CAE2B0}" type="datetimeFigureOut">
               <a:rPr lang="en-US" smtClean="0"/>
-              <a:t>4/26/17</a:t>
+              <a:t>5/11/17</a:t>
             </a:fld>
             <a:endParaRPr lang="en-US"/>
           </a:p>
@@ -4819,7 +4819,7 @@
           <a:p>
             <a:fld id="{7C0312F8-2DE2-6B40-83C5-731724CAE2B0}" type="datetimeFigureOut">
               <a:rPr lang="en-US" smtClean="0"/>
-              <a:t>4/26/17</a:t>
+              <a:t>5/11/17</a:t>
             </a:fld>
             <a:endParaRPr lang="en-US"/>
           </a:p>
@@ -5107,7 +5107,7 @@
           <a:p>
             <a:fld id="{7C0312F8-2DE2-6B40-83C5-731724CAE2B0}" type="datetimeFigureOut">
               <a:rPr lang="en-US" smtClean="0"/>
-              <a:t>4/26/17</a:t>
+              <a:t>5/11/17</a:t>
             </a:fld>
             <a:endParaRPr lang="en-US"/>
           </a:p>
@@ -5529,7 +5529,7 @@
           <a:p>
             <a:fld id="{7C0312F8-2DE2-6B40-83C5-731724CAE2B0}" type="datetimeFigureOut">
               <a:rPr lang="en-US" smtClean="0"/>
-              <a:t>4/26/17</a:t>
+              <a:t>5/11/17</a:t>
             </a:fld>
             <a:endParaRPr lang="en-US"/>
           </a:p>
@@ -5773,7 +5773,7 @@
           <a:p>
             <a:fld id="{7C0312F8-2DE2-6B40-83C5-731724CAE2B0}" type="datetimeFigureOut">
               <a:rPr lang="en-US" smtClean="0"/>
-              <a:t>4/26/17</a:t>
+              <a:t>5/11/17</a:t>
             </a:fld>
             <a:endParaRPr lang="en-US"/>
           </a:p>
@@ -6050,7 +6050,7 @@
           <a:p>
             <a:fld id="{7C0312F8-2DE2-6B40-83C5-731724CAE2B0}" type="datetimeFigureOut">
               <a:rPr lang="en-US" smtClean="0"/>
-              <a:t>4/26/17</a:t>
+              <a:t>5/11/17</a:t>
             </a:fld>
             <a:endParaRPr lang="en-US"/>
           </a:p>
@@ -6307,7 +6307,7 @@
           <a:p>
             <a:fld id="{7C0312F8-2DE2-6B40-83C5-731724CAE2B0}" type="datetimeFigureOut">
               <a:rPr lang="en-US" smtClean="0"/>
-              <a:t>4/26/17</a:t>
+              <a:t>5/11/17</a:t>
             </a:fld>
             <a:endParaRPr lang="en-US"/>
           </a:p>
@@ -6520,7 +6520,7 @@
           <a:p>
             <a:fld id="{7C0312F8-2DE2-6B40-83C5-731724CAE2B0}" type="datetimeFigureOut">
               <a:rPr lang="en-US" smtClean="0"/>
-              <a:t>4/26/17</a:t>
+              <a:t>5/11/17</a:t>
             </a:fld>
             <a:endParaRPr lang="en-US"/>
           </a:p>
@@ -7212,112 +7212,6 @@
           <a:p>
             <a:r>
               <a:rPr lang="en-US" dirty="0" smtClean="0"/>
-              <a:t>Equal width bins</a:t>
-            </a:r>
-          </a:p>
-          <a:p>
-            <a:r>
-              <a:rPr lang="en-US" dirty="0" smtClean="0"/>
-              <a:t>Equal size bins</a:t>
-            </a:r>
-          </a:p>
-          <a:p>
-            <a:r>
-              <a:rPr lang="en-US" dirty="0" smtClean="0"/>
-              <a:t>Entropy-based bins</a:t>
-            </a:r>
-          </a:p>
-          <a:p>
-            <a:r>
-              <a:rPr lang="en-US" dirty="0" smtClean="0"/>
-              <a:t>Domain-Specific </a:t>
-            </a:r>
-            <a:r>
-              <a:rPr lang="en-US" dirty="0" smtClean="0"/>
-              <a:t>bins (infant, KG, </a:t>
-            </a:r>
-            <a:r>
-              <a:rPr lang="en-US" dirty="0" err="1" smtClean="0"/>
-              <a:t>Elemantary</a:t>
-            </a:r>
-            <a:r>
-              <a:rPr lang="en-US" dirty="0" smtClean="0"/>
-              <a:t> school age, middle school age, etc.)</a:t>
-            </a:r>
-            <a:endParaRPr lang="en-US" dirty="0" smtClean="0"/>
-          </a:p>
-        </p:txBody>
-      </p:sp>
-      <p:sp>
-        <p:nvSpPr>
-          <p:cNvPr id="3" name="Title 2"/>
-          <p:cNvSpPr>
-            <a:spLocks noGrp="1"/>
-          </p:cNvSpPr>
-          <p:nvPr>
-            <p:ph type="title"/>
-          </p:nvPr>
-        </p:nvSpPr>
-        <p:spPr/>
-        <p:txBody>
-          <a:bodyPr/>
-          <a:lstStyle/>
-          <a:p>
-            <a:r>
-              <a:rPr lang="en-US" dirty="0" smtClean="0"/>
-              <a:t>Discretization</a:t>
-            </a:r>
-            <a:endParaRPr lang="en-US" dirty="0"/>
-          </a:p>
-        </p:txBody>
-      </p:sp>
-    </p:spTree>
-    <p:extLst>
-      <p:ext uri="{BB962C8B-B14F-4D97-AF65-F5344CB8AC3E}">
-        <p14:creationId xmlns:p14="http://schemas.microsoft.com/office/powerpoint/2010/main" val="1878538625"/>
-      </p:ext>
-    </p:extLst>
-  </p:cSld>
-  <p:clrMapOvr>
-    <a:masterClrMapping/>
-  </p:clrMapOvr>
-</p:sld>
-</file>
-
-<file path=ppt/slides/slide11.xml><?xml version="1.0" encoding="utf-8"?>
-<p:sld xmlns:a="http://schemas.openxmlformats.org/drawingml/2006/main" xmlns:r="http://schemas.openxmlformats.org/officeDocument/2006/relationships" xmlns:p="http://schemas.openxmlformats.org/presentationml/2006/main">
-  <p:cSld>
-    <p:spTree>
-      <p:nvGrpSpPr>
-        <p:cNvPr id="1" name=""/>
-        <p:cNvGrpSpPr/>
-        <p:nvPr/>
-      </p:nvGrpSpPr>
-      <p:grpSpPr>
-        <a:xfrm>
-          <a:off x="0" y="0"/>
-          <a:ext cx="0" cy="0"/>
-          <a:chOff x="0" y="0"/>
-          <a:chExt cx="0" cy="0"/>
-        </a:xfrm>
-      </p:grpSpPr>
-      <p:sp>
-        <p:nvSpPr>
-          <p:cNvPr id="2" name="Content Placeholder 1"/>
-          <p:cNvSpPr>
-            <a:spLocks noGrp="1"/>
-          </p:cNvSpPr>
-          <p:nvPr>
-            <p:ph idx="1"/>
-          </p:nvPr>
-        </p:nvSpPr>
-        <p:spPr/>
-        <p:txBody>
-          <a:bodyPr/>
-          <a:lstStyle/>
-          <a:p>
-            <a:r>
-              <a:rPr lang="en-US" dirty="0" smtClean="0"/>
               <a:t>Usually a good idea to scale features to have similar range:  [-1,1] or [0,1] for example</a:t>
             </a:r>
           </a:p>
@@ -7432,6 +7326,195 @@
 </p:sld>
 </file>
 
+<file path=ppt/slides/slide11.xml><?xml version="1.0" encoding="utf-8"?>
+<p:sld xmlns:a="http://schemas.openxmlformats.org/drawingml/2006/main" xmlns:r="http://schemas.openxmlformats.org/officeDocument/2006/relationships" xmlns:p="http://schemas.openxmlformats.org/presentationml/2006/main">
+  <p:cSld>
+    <p:spTree>
+      <p:nvGrpSpPr>
+        <p:cNvPr id="1" name=""/>
+        <p:cNvGrpSpPr/>
+        <p:nvPr/>
+      </p:nvGrpSpPr>
+      <p:grpSpPr>
+        <a:xfrm>
+          <a:off x="0" y="0"/>
+          <a:ext cx="0" cy="0"/>
+          <a:chOff x="0" y="0"/>
+          <a:chExt cx="0" cy="0"/>
+        </a:xfrm>
+      </p:grpSpPr>
+      <p:sp>
+        <p:nvSpPr>
+          <p:cNvPr id="2" name="Content Placeholder 1"/>
+          <p:cNvSpPr>
+            <a:spLocks noGrp="1"/>
+          </p:cNvSpPr>
+          <p:nvPr>
+            <p:ph idx="1"/>
+          </p:nvPr>
+        </p:nvSpPr>
+        <p:spPr/>
+        <p:txBody>
+          <a:bodyPr/>
+          <a:lstStyle/>
+          <a:p>
+            <a:r>
+              <a:rPr lang="en-US" dirty="0" smtClean="0"/>
+              <a:t>Non-linear </a:t>
+            </a:r>
+          </a:p>
+          <a:p>
+            <a:endParaRPr lang="en-US" dirty="0" smtClean="0"/>
+          </a:p>
+          <a:p>
+            <a:pPr lvl="1"/>
+            <a:r>
+              <a:rPr lang="en-US" dirty="0" smtClean="0"/>
+              <a:t>Log (decreasing marginal utility)</a:t>
+            </a:r>
+          </a:p>
+          <a:p>
+            <a:pPr marL="457200" lvl="1" indent="0">
+              <a:buNone/>
+            </a:pPr>
+            <a:endParaRPr lang="en-US" dirty="0" smtClean="0"/>
+          </a:p>
+          <a:p>
+            <a:pPr lvl="1"/>
+            <a:r>
+              <a:rPr lang="en-US" dirty="0" smtClean="0"/>
+              <a:t>(Square) Root</a:t>
+            </a:r>
+          </a:p>
+          <a:p>
+            <a:pPr lvl="1"/>
+            <a:endParaRPr lang="en-US" dirty="0"/>
+          </a:p>
+          <a:p>
+            <a:pPr lvl="1"/>
+            <a:r>
+              <a:rPr lang="en-US" dirty="0" smtClean="0"/>
+              <a:t>Squared</a:t>
+            </a:r>
+            <a:endParaRPr lang="en-US" dirty="0"/>
+          </a:p>
+        </p:txBody>
+      </p:sp>
+      <p:sp>
+        <p:nvSpPr>
+          <p:cNvPr id="3" name="Title 2"/>
+          <p:cNvSpPr>
+            <a:spLocks noGrp="1"/>
+          </p:cNvSpPr>
+          <p:nvPr>
+            <p:ph type="title"/>
+          </p:nvPr>
+        </p:nvSpPr>
+        <p:spPr/>
+        <p:txBody>
+          <a:bodyPr/>
+          <a:lstStyle/>
+          <a:p>
+            <a:r>
+              <a:rPr lang="en-US" dirty="0" smtClean="0"/>
+              <a:t>Feature Transformations</a:t>
+            </a:r>
+            <a:endParaRPr lang="en-US" dirty="0"/>
+          </a:p>
+        </p:txBody>
+      </p:sp>
+      <p:pic>
+        <p:nvPicPr>
+          <p:cNvPr id="4" name="Picture 3"/>
+          <p:cNvPicPr>
+            <a:picLocks noChangeAspect="1"/>
+          </p:cNvPicPr>
+          <p:nvPr/>
+        </p:nvPicPr>
+        <p:blipFill>
+          <a:blip r:embed="rId2"/>
+          <a:stretch>
+            <a:fillRect/>
+          </a:stretch>
+        </p:blipFill>
+        <p:spPr>
+          <a:xfrm>
+            <a:off x="5641976" y="1237937"/>
+            <a:ext cx="2042645" cy="1666368"/>
+          </a:xfrm>
+          <a:prstGeom prst="rect">
+            <a:avLst/>
+          </a:prstGeom>
+        </p:spPr>
+      </p:pic>
+      <p:pic>
+        <p:nvPicPr>
+          <p:cNvPr id="5" name="Picture 4"/>
+          <p:cNvPicPr>
+            <a:picLocks noChangeAspect="1"/>
+          </p:cNvPicPr>
+          <p:nvPr/>
+        </p:nvPicPr>
+        <p:blipFill>
+          <a:blip r:embed="rId3"/>
+          <a:stretch>
+            <a:fillRect/>
+          </a:stretch>
+        </p:blipFill>
+        <p:spPr>
+          <a:xfrm>
+            <a:off x="5182074" y="3091698"/>
+            <a:ext cx="2502547" cy="1947152"/>
+          </a:xfrm>
+          <a:prstGeom prst="rect">
+            <a:avLst/>
+          </a:prstGeom>
+        </p:spPr>
+      </p:pic>
+      <p:pic>
+        <p:nvPicPr>
+          <p:cNvPr id="6" name="Picture 5"/>
+          <p:cNvPicPr>
+            <a:picLocks noChangeAspect="1"/>
+          </p:cNvPicPr>
+          <p:nvPr/>
+        </p:nvPicPr>
+        <p:blipFill>
+          <a:blip r:embed="rId4"/>
+          <a:stretch>
+            <a:fillRect/>
+          </a:stretch>
+        </p:blipFill>
+        <p:spPr>
+          <a:xfrm>
+            <a:off x="2451906" y="4633477"/>
+            <a:ext cx="1752816" cy="1862367"/>
+          </a:xfrm>
+          <a:prstGeom prst="rect">
+            <a:avLst/>
+          </a:prstGeom>
+        </p:spPr>
+      </p:pic>
+    </p:spTree>
+    <p:extLst>
+      <p:ext uri="{BB962C8B-B14F-4D97-AF65-F5344CB8AC3E}">
+        <p14:creationId xmlns:p14="http://schemas.microsoft.com/office/powerpoint/2010/main" val="661074902"/>
+      </p:ext>
+    </p:extLst>
+  </p:cSld>
+  <p:clrMapOvr>
+    <a:masterClrMapping/>
+  </p:clrMapOvr>
+  <p:timing>
+    <p:tnLst>
+      <p:par>
+        <p:cTn id="1" dur="indefinite" restart="never" nodeType="tmRoot"/>
+      </p:par>
+    </p:tnLst>
+  </p:timing>
+</p:sld>
+</file>
+
 <file path=ppt/slides/slide12.xml><?xml version="1.0" encoding="utf-8"?>
 <p:sld xmlns:a="http://schemas.openxmlformats.org/drawingml/2006/main" xmlns:r="http://schemas.openxmlformats.org/officeDocument/2006/relationships" xmlns:p="http://schemas.openxmlformats.org/presentationml/2006/main">
   <p:cSld>
@@ -7461,52 +7544,103 @@
         </p:nvSpPr>
         <p:spPr/>
         <p:txBody>
-          <a:bodyPr/>
+          <a:bodyPr>
+            <a:normAutofit lnSpcReduction="10000"/>
+          </a:bodyPr>
           <a:lstStyle/>
           <a:p>
             <a:r>
               <a:rPr lang="en-US" dirty="0" smtClean="0"/>
-              <a:t>Non-linear </a:t>
-            </a:r>
-          </a:p>
-          <a:p>
+              <a:t>Date differences (# of days since…)</a:t>
+            </a:r>
+          </a:p>
+          <a:p>
+            <a:r>
+              <a:rPr lang="en-US" dirty="0" smtClean="0"/>
+              <a:t>Aggregates over different time periods</a:t>
+            </a:r>
+          </a:p>
+          <a:p>
+            <a:pPr lvl="1"/>
+            <a:r>
+              <a:rPr lang="en-US" dirty="0" smtClean="0"/>
+              <a:t>Min, max, </a:t>
+            </a:r>
+            <a:r>
+              <a:rPr lang="en-US" dirty="0" err="1" smtClean="0"/>
+              <a:t>avg</a:t>
+            </a:r>
+            <a:r>
+              <a:rPr lang="en-US" dirty="0" smtClean="0"/>
+              <a:t>, </a:t>
+            </a:r>
+            <a:r>
+              <a:rPr lang="en-US" dirty="0" err="1" smtClean="0"/>
+              <a:t>stdev</a:t>
+            </a:r>
             <a:endParaRPr lang="en-US" dirty="0" smtClean="0"/>
           </a:p>
           <a:p>
             <a:pPr lvl="1"/>
             <a:r>
+              <a:rPr lang="en-US" dirty="0" err="1" smtClean="0"/>
+              <a:t>Avg</a:t>
+            </a:r>
+            <a:r>
               <a:rPr lang="en-US" dirty="0" smtClean="0"/>
-              <a:t>Log (decreasing marginal utility)</a:t>
-            </a:r>
-          </a:p>
-          <a:p>
-            <a:pPr marL="457200" lvl="1" indent="0">
-              <a:buNone/>
-            </a:pPr>
+              <a:t> spend in the past 3 months</a:t>
+            </a:r>
+          </a:p>
+          <a:p>
+            <a:r>
+              <a:rPr lang="en-US" dirty="0" smtClean="0"/>
+              <a:t>Relative aggregates</a:t>
+            </a:r>
+          </a:p>
+          <a:p>
+            <a:pPr lvl="1"/>
+            <a:r>
+              <a:rPr lang="en-US" dirty="0" smtClean="0"/>
+              <a:t>1.5x </a:t>
+            </a:r>
+            <a:r>
+              <a:rPr lang="en-US" dirty="0" err="1" smtClean="0"/>
+              <a:t>avg</a:t>
+            </a:r>
+            <a:r>
+              <a:rPr lang="en-US" dirty="0" smtClean="0"/>
+              <a:t> spend</a:t>
+            </a:r>
+          </a:p>
+          <a:p>
+            <a:r>
+              <a:rPr lang="en-US" dirty="0" smtClean="0"/>
+              <a:t>Distances</a:t>
+            </a:r>
+          </a:p>
+          <a:p>
+            <a:r>
+              <a:rPr lang="en-US" dirty="0"/>
+              <a:t>Aggregates over different </a:t>
+            </a:r>
+            <a:r>
+              <a:rPr lang="en-US" dirty="0" smtClean="0"/>
+              <a:t>distances</a:t>
+            </a:r>
+          </a:p>
+          <a:p>
+            <a:r>
+              <a:rPr lang="en-US" dirty="0" smtClean="0"/>
+              <a:t>Seasonality</a:t>
+            </a:r>
+          </a:p>
+          <a:p>
+            <a:endParaRPr lang="en-US" dirty="0"/>
+          </a:p>
+          <a:p>
             <a:endParaRPr lang="en-US" dirty="0" smtClean="0"/>
           </a:p>
           <a:p>
-            <a:pPr lvl="1"/>
-            <a:r>
-              <a:rPr lang="en-US" dirty="0" smtClean="0"/>
-              <a:t>(Square) Root</a:t>
-            </a:r>
-          </a:p>
-          <a:p>
-            <a:pPr lvl="1"/>
-            <a:endParaRPr lang="en-US" dirty="0"/>
-          </a:p>
-          <a:p>
-            <a:pPr lvl="1"/>
-            <a:r>
-              <a:rPr lang="en-US" dirty="0"/>
-              <a:t>Squared</a:t>
-            </a:r>
-          </a:p>
-          <a:p>
-            <a:pPr marL="457200" lvl="1" indent="0">
-              <a:buNone/>
-            </a:pPr>
             <a:endParaRPr lang="en-US" dirty="0"/>
           </a:p>
         </p:txBody>
@@ -7528,7 +7662,7 @@
           <a:p>
             <a:r>
               <a:rPr lang="en-US" dirty="0" smtClean="0"/>
-              <a:t>Feature Transformations</a:t>
+              <a:t>Aggregations</a:t>
             </a:r>
             <a:endParaRPr lang="en-US" dirty="0"/>
           </a:p>
@@ -7537,7 +7671,7 @@
     </p:spTree>
     <p:extLst>
       <p:ext uri="{BB962C8B-B14F-4D97-AF65-F5344CB8AC3E}">
-        <p14:creationId xmlns:p14="http://schemas.microsoft.com/office/powerpoint/2010/main" val="661074902"/>
+        <p14:creationId xmlns:p14="http://schemas.microsoft.com/office/powerpoint/2010/main" val="3361523852"/>
       </p:ext>
     </p:extLst>
   </p:cSld>
@@ -7583,104 +7717,40 @@
         </p:nvSpPr>
         <p:spPr/>
         <p:txBody>
-          <a:bodyPr>
-            <a:normAutofit lnSpcReduction="10000"/>
-          </a:bodyPr>
+          <a:bodyPr/>
           <a:lstStyle/>
           <a:p>
             <a:r>
               <a:rPr lang="en-US" dirty="0" smtClean="0"/>
-              <a:t>Date differences (# of days since…)</a:t>
-            </a:r>
-          </a:p>
-          <a:p>
+              <a:t>Generate features for combination of features</a:t>
+            </a:r>
+          </a:p>
+          <a:p>
+            <a:pPr lvl="1"/>
             <a:r>
               <a:rPr lang="en-US" dirty="0" smtClean="0"/>
-              <a:t>Aggregates over different time periods</a:t>
-            </a:r>
+              <a:t>Age x gender</a:t>
+            </a:r>
+            <a:endParaRPr lang="en-US" dirty="0"/>
           </a:p>
           <a:p>
             <a:pPr lvl="1"/>
+            <a:endParaRPr lang="en-US" dirty="0"/>
+          </a:p>
+          <a:p>
             <a:r>
               <a:rPr lang="en-US" dirty="0" smtClean="0"/>
-              <a:t>Min, max, </a:t>
-            </a:r>
-            <a:r>
-              <a:rPr lang="en-US" dirty="0" err="1" smtClean="0"/>
-              <a:t>avg</a:t>
-            </a:r>
+              <a:t>Allows you to use linear models but still model non linear relationships</a:t>
+            </a:r>
+          </a:p>
+          <a:p>
+            <a:endParaRPr lang="en-US" dirty="0"/>
+          </a:p>
+          <a:p>
             <a:r>
               <a:rPr lang="en-US" dirty="0" smtClean="0"/>
-              <a:t>, </a:t>
-            </a:r>
-            <a:r>
-              <a:rPr lang="en-US" dirty="0" err="1" smtClean="0"/>
-              <a:t>stdev</a:t>
-            </a:r>
-            <a:endParaRPr lang="en-US" dirty="0" smtClean="0"/>
-          </a:p>
-          <a:p>
-            <a:pPr lvl="1"/>
-            <a:r>
-              <a:rPr lang="en-US" dirty="0" err="1" smtClean="0"/>
-              <a:t>Avg</a:t>
-            </a:r>
-            <a:r>
-              <a:rPr lang="en-US" dirty="0" smtClean="0"/>
-              <a:t> spend in the past 3 months</a:t>
-            </a:r>
-          </a:p>
-          <a:p>
-            <a:r>
-              <a:rPr lang="en-US" dirty="0" smtClean="0"/>
-              <a:t>Relative aggregates</a:t>
-            </a:r>
-          </a:p>
-          <a:p>
-            <a:pPr lvl="1"/>
-            <a:r>
-              <a:rPr lang="en-US" dirty="0" smtClean="0"/>
-              <a:t>1.5x </a:t>
-            </a:r>
-            <a:r>
-              <a:rPr lang="en-US" dirty="0" err="1" smtClean="0"/>
-              <a:t>avg</a:t>
-            </a:r>
-            <a:r>
-              <a:rPr lang="en-US" dirty="0" smtClean="0"/>
-              <a:t> spend</a:t>
-            </a:r>
-          </a:p>
-          <a:p>
-            <a:r>
-              <a:rPr lang="en-US" dirty="0" smtClean="0"/>
-              <a:t>Distances</a:t>
-            </a:r>
-          </a:p>
-          <a:p>
-            <a:r>
-              <a:rPr lang="en-US" dirty="0"/>
-              <a:t>Aggregates over different </a:t>
-            </a:r>
-            <a:r>
-              <a:rPr lang="en-US" dirty="0" smtClean="0"/>
-              <a:t>distances</a:t>
-            </a:r>
-          </a:p>
-          <a:p>
-            <a:r>
-              <a:rPr lang="en-US" dirty="0" smtClean="0"/>
-              <a:t>Seasonality</a:t>
-            </a:r>
-          </a:p>
-          <a:p>
-            <a:endParaRPr lang="en-US" dirty="0"/>
-          </a:p>
-          <a:p>
-            <a:endParaRPr lang="en-US" dirty="0" smtClean="0"/>
-          </a:p>
-          <a:p>
-            <a:endParaRPr lang="en-US" dirty="0"/>
+              <a:t>Random Forests are one way of discovering useful interactions</a:t>
+            </a:r>
           </a:p>
         </p:txBody>
       </p:sp>
@@ -7701,7 +7771,7 @@
           <a:p>
             <a:r>
               <a:rPr lang="en-US" dirty="0" smtClean="0"/>
-              <a:t>Aggregations</a:t>
+              <a:t>Feature Interactions</a:t>
             </a:r>
             <a:endParaRPr lang="en-US" dirty="0"/>
           </a:p>
@@ -7710,7 +7780,7 @@
     </p:spTree>
     <p:extLst>
       <p:ext uri="{BB962C8B-B14F-4D97-AF65-F5344CB8AC3E}">
-        <p14:creationId xmlns:p14="http://schemas.microsoft.com/office/powerpoint/2010/main" val="3361523852"/>
+        <p14:creationId xmlns:p14="http://schemas.microsoft.com/office/powerpoint/2010/main" val="1896518887"/>
       </p:ext>
     </p:extLst>
   </p:cSld>
@@ -7761,35 +7831,17 @@
           <a:p>
             <a:r>
               <a:rPr lang="en-US" dirty="0" smtClean="0"/>
-              <a:t>Generate features for combination of features</a:t>
-            </a:r>
-          </a:p>
-          <a:p>
-            <a:pPr lvl="1"/>
+              <a:t>Decision trees may need differences between values (dates, amounts, etc.)</a:t>
+            </a:r>
+          </a:p>
+          <a:p>
             <a:r>
               <a:rPr lang="en-US" dirty="0" smtClean="0"/>
-              <a:t>Age x gender</a:t>
-            </a:r>
+              <a:t>Linear models may need</a:t>
+            </a:r>
+          </a:p>
+          <a:p>
             <a:endParaRPr lang="en-US" dirty="0"/>
-          </a:p>
-          <a:p>
-            <a:pPr lvl="1"/>
-            <a:endParaRPr lang="en-US" dirty="0"/>
-          </a:p>
-          <a:p>
-            <a:r>
-              <a:rPr lang="en-US" dirty="0" smtClean="0"/>
-              <a:t>Allows you to use linear models but still model non linear relationships</a:t>
-            </a:r>
-          </a:p>
-          <a:p>
-            <a:endParaRPr lang="en-US" dirty="0"/>
-          </a:p>
-          <a:p>
-            <a:r>
-              <a:rPr lang="en-US" dirty="0" smtClean="0"/>
-              <a:t>Random Forests are one way of discovering useful interactions</a:t>
-            </a:r>
           </a:p>
         </p:txBody>
       </p:sp>
@@ -7810,7 +7862,7 @@
           <a:p>
             <a:r>
               <a:rPr lang="en-US" dirty="0" smtClean="0"/>
-              <a:t>Feature Interactions</a:t>
+              <a:t>Features are also model-dependent</a:t>
             </a:r>
             <a:endParaRPr lang="en-US" dirty="0"/>
           </a:p>
@@ -7819,20 +7871,13 @@
     </p:spTree>
     <p:extLst>
       <p:ext uri="{BB962C8B-B14F-4D97-AF65-F5344CB8AC3E}">
-        <p14:creationId xmlns:p14="http://schemas.microsoft.com/office/powerpoint/2010/main" val="1896518887"/>
+        <p14:creationId xmlns:p14="http://schemas.microsoft.com/office/powerpoint/2010/main" val="773779376"/>
       </p:ext>
     </p:extLst>
   </p:cSld>
   <p:clrMapOvr>
     <a:masterClrMapping/>
   </p:clrMapOvr>
-  <p:timing>
-    <p:tnLst>
-      <p:par>
-        <p:cTn id="1" dur="indefinite" restart="never" nodeType="tmRoot"/>
-      </p:par>
-    </p:tnLst>
-  </p:timing>
 </p:sld>
 </file>
 
@@ -10043,852 +10088,6 @@
           <a:chExt cx="0" cy="0"/>
         </a:xfrm>
       </p:grpSpPr>
-      <p:graphicFrame>
-        <p:nvGraphicFramePr>
-          <p:cNvPr id="4" name="Content Placeholder 3"/>
-          <p:cNvGraphicFramePr>
-            <a:graphicFrameLocks noGrp="1"/>
-          </p:cNvGraphicFramePr>
-          <p:nvPr>
-            <p:ph idx="1"/>
-            <p:extLst>
-              <p:ext uri="{D42A27DB-BD31-4B8C-83A1-F6EECF244321}">
-                <p14:modId xmlns:p14="http://schemas.microsoft.com/office/powerpoint/2010/main" val="2370773629"/>
-              </p:ext>
-            </p:extLst>
-          </p:nvPr>
-        </p:nvGraphicFramePr>
-        <p:xfrm>
-          <a:off x="5997510" y="1474703"/>
-          <a:ext cx="2698882" cy="4859184"/>
-        </p:xfrm>
-        <a:graphic>
-          <a:graphicData uri="http://schemas.openxmlformats.org/drawingml/2006/table">
-            <a:tbl>
-              <a:tblPr/>
-              <a:tblGrid>
-                <a:gridCol w="2698882"/>
-              </a:tblGrid>
-              <a:tr h="441744">
-                <a:tc>
-                  <a:txBody>
-                    <a:bodyPr/>
-                    <a:lstStyle/>
-                    <a:p>
-                      <a:pPr algn="l" fontAlgn="b"/>
-                      <a:r>
-                        <a:rPr lang="en-US" sz="2400" b="0" i="0" u="none" strike="noStrike">
-                          <a:solidFill>
-                            <a:srgbClr val="000000"/>
-                          </a:solidFill>
-                          <a:effectLst/>
-                          <a:latin typeface="Calibri"/>
-                        </a:rPr>
-                        <a:t>VisitId</a:t>
-                      </a:r>
-                    </a:p>
-                  </a:txBody>
-                  <a:tcPr marL="12700" marR="12700" marT="12700" marB="0" anchor="b">
-                    <a:lnL>
-                      <a:noFill/>
-                    </a:lnL>
-                    <a:lnR>
-                      <a:noFill/>
-                    </a:lnR>
-                    <a:lnT>
-                      <a:noFill/>
-                    </a:lnT>
-                    <a:lnB>
-                      <a:noFill/>
-                    </a:lnB>
-                  </a:tcPr>
-                </a:tc>
-              </a:tr>
-              <a:tr h="441744">
-                <a:tc>
-                  <a:txBody>
-                    <a:bodyPr/>
-                    <a:lstStyle/>
-                    <a:p>
-                      <a:pPr algn="l" fontAlgn="b"/>
-                      <a:r>
-                        <a:rPr lang="en-US" sz="2400" b="0" i="0" u="none" strike="noStrike">
-                          <a:solidFill>
-                            <a:srgbClr val="000000"/>
-                          </a:solidFill>
-                          <a:effectLst/>
-                          <a:latin typeface="Calibri"/>
-                        </a:rPr>
-                        <a:t>PatientID</a:t>
-                      </a:r>
-                    </a:p>
-                  </a:txBody>
-                  <a:tcPr marL="12700" marR="12700" marT="12700" marB="0" anchor="b">
-                    <a:lnL>
-                      <a:noFill/>
-                    </a:lnL>
-                    <a:lnR>
-                      <a:noFill/>
-                    </a:lnR>
-                    <a:lnT>
-                      <a:noFill/>
-                    </a:lnT>
-                    <a:lnB>
-                      <a:noFill/>
-                    </a:lnB>
-                  </a:tcPr>
-                </a:tc>
-              </a:tr>
-              <a:tr h="441744">
-                <a:tc>
-                  <a:txBody>
-                    <a:bodyPr/>
-                    <a:lstStyle/>
-                    <a:p>
-                      <a:pPr algn="l" fontAlgn="b"/>
-                      <a:r>
-                        <a:rPr lang="en-US" sz="2400" b="0" i="0" u="none" strike="noStrike" dirty="0" smtClean="0">
-                          <a:solidFill>
-                            <a:srgbClr val="000000"/>
-                          </a:solidFill>
-                          <a:effectLst/>
-                          <a:latin typeface="Calibri"/>
-                        </a:rPr>
-                        <a:t>Visit Reason</a:t>
-                      </a:r>
-                      <a:endParaRPr lang="en-US" sz="2400" b="0" i="0" u="none" strike="noStrike" dirty="0">
-                        <a:solidFill>
-                          <a:srgbClr val="000000"/>
-                        </a:solidFill>
-                        <a:effectLst/>
-                        <a:latin typeface="Calibri"/>
-                      </a:endParaRPr>
-                    </a:p>
-                  </a:txBody>
-                  <a:tcPr marL="12700" marR="12700" marT="12700" marB="0" anchor="b">
-                    <a:lnL>
-                      <a:noFill/>
-                    </a:lnL>
-                    <a:lnR>
-                      <a:noFill/>
-                    </a:lnR>
-                    <a:lnT>
-                      <a:noFill/>
-                    </a:lnT>
-                    <a:lnB>
-                      <a:noFill/>
-                    </a:lnB>
-                  </a:tcPr>
-                </a:tc>
-              </a:tr>
-              <a:tr h="441744">
-                <a:tc>
-                  <a:txBody>
-                    <a:bodyPr/>
-                    <a:lstStyle/>
-                    <a:p>
-                      <a:pPr algn="l" fontAlgn="b"/>
-                      <a:r>
-                        <a:rPr lang="en-US" sz="2400" b="0" i="0" u="none" strike="noStrike">
-                          <a:solidFill>
-                            <a:srgbClr val="000000"/>
-                          </a:solidFill>
-                          <a:effectLst/>
-                          <a:latin typeface="Calibri"/>
-                        </a:rPr>
-                        <a:t>Diagnosis</a:t>
-                      </a:r>
-                    </a:p>
-                  </a:txBody>
-                  <a:tcPr marL="12700" marR="12700" marT="12700" marB="0" anchor="b">
-                    <a:lnL>
-                      <a:noFill/>
-                    </a:lnL>
-                    <a:lnR>
-                      <a:noFill/>
-                    </a:lnR>
-                    <a:lnT>
-                      <a:noFill/>
-                    </a:lnT>
-                    <a:lnB>
-                      <a:noFill/>
-                    </a:lnB>
-                  </a:tcPr>
-                </a:tc>
-              </a:tr>
-              <a:tr h="441744">
-                <a:tc>
-                  <a:txBody>
-                    <a:bodyPr/>
-                    <a:lstStyle/>
-                    <a:p>
-                      <a:pPr algn="l" fontAlgn="b"/>
-                      <a:r>
-                        <a:rPr lang="en-US" sz="2400" b="0" i="0" u="none" strike="noStrike" dirty="0">
-                          <a:solidFill>
-                            <a:srgbClr val="000000"/>
-                          </a:solidFill>
-                          <a:effectLst/>
-                          <a:latin typeface="Calibri"/>
-                        </a:rPr>
-                        <a:t>Procedure</a:t>
-                      </a:r>
-                    </a:p>
-                  </a:txBody>
-                  <a:tcPr marL="12700" marR="12700" marT="12700" marB="0" anchor="b">
-                    <a:lnL>
-                      <a:noFill/>
-                    </a:lnL>
-                    <a:lnR>
-                      <a:noFill/>
-                    </a:lnR>
-                    <a:lnT>
-                      <a:noFill/>
-                    </a:lnT>
-                    <a:lnB>
-                      <a:noFill/>
-                    </a:lnB>
-                  </a:tcPr>
-                </a:tc>
-              </a:tr>
-              <a:tr h="441744">
-                <a:tc>
-                  <a:txBody>
-                    <a:bodyPr/>
-                    <a:lstStyle/>
-                    <a:p>
-                      <a:pPr algn="l" fontAlgn="b"/>
-                      <a:r>
-                        <a:rPr lang="en-US" sz="2400" b="0" i="0" u="none" strike="noStrike">
-                          <a:solidFill>
-                            <a:srgbClr val="000000"/>
-                          </a:solidFill>
-                          <a:effectLst/>
-                          <a:latin typeface="Calibri"/>
-                        </a:rPr>
-                        <a:t>Cost</a:t>
-                      </a:r>
-                    </a:p>
-                  </a:txBody>
-                  <a:tcPr marL="12700" marR="12700" marT="12700" marB="0" anchor="b">
-                    <a:lnL>
-                      <a:noFill/>
-                    </a:lnL>
-                    <a:lnR>
-                      <a:noFill/>
-                    </a:lnR>
-                    <a:lnT>
-                      <a:noFill/>
-                    </a:lnT>
-                    <a:lnB>
-                      <a:noFill/>
-                    </a:lnB>
-                  </a:tcPr>
-                </a:tc>
-              </a:tr>
-              <a:tr h="441744">
-                <a:tc>
-                  <a:txBody>
-                    <a:bodyPr/>
-                    <a:lstStyle/>
-                    <a:p>
-                      <a:pPr algn="l" fontAlgn="b"/>
-                      <a:r>
-                        <a:rPr lang="en-US" sz="2400" b="0" i="0" u="none" strike="noStrike" dirty="0">
-                          <a:solidFill>
-                            <a:srgbClr val="000000"/>
-                          </a:solidFill>
-                          <a:effectLst/>
-                          <a:latin typeface="Calibri"/>
-                        </a:rPr>
-                        <a:t>Charged</a:t>
-                      </a:r>
-                    </a:p>
-                  </a:txBody>
-                  <a:tcPr marL="12700" marR="12700" marT="12700" marB="0" anchor="b">
-                    <a:lnL>
-                      <a:noFill/>
-                    </a:lnL>
-                    <a:lnR>
-                      <a:noFill/>
-                    </a:lnR>
-                    <a:lnT>
-                      <a:noFill/>
-                    </a:lnT>
-                    <a:lnB>
-                      <a:noFill/>
-                    </a:lnB>
-                  </a:tcPr>
-                </a:tc>
-              </a:tr>
-              <a:tr h="441744">
-                <a:tc>
-                  <a:txBody>
-                    <a:bodyPr/>
-                    <a:lstStyle/>
-                    <a:p>
-                      <a:pPr algn="l" fontAlgn="b"/>
-                      <a:r>
-                        <a:rPr lang="en-US" sz="2400" b="0" i="0" u="none" strike="noStrike">
-                          <a:solidFill>
-                            <a:srgbClr val="000000"/>
-                          </a:solidFill>
-                          <a:effectLst/>
-                          <a:latin typeface="Calibri"/>
-                        </a:rPr>
-                        <a:t>Insurance</a:t>
-                      </a:r>
-                    </a:p>
-                  </a:txBody>
-                  <a:tcPr marL="12700" marR="12700" marT="12700" marB="0" anchor="b">
-                    <a:lnL>
-                      <a:noFill/>
-                    </a:lnL>
-                    <a:lnR>
-                      <a:noFill/>
-                    </a:lnR>
-                    <a:lnT>
-                      <a:noFill/>
-                    </a:lnT>
-                    <a:lnB>
-                      <a:noFill/>
-                    </a:lnB>
-                  </a:tcPr>
-                </a:tc>
-              </a:tr>
-              <a:tr h="441744">
-                <a:tc>
-                  <a:txBody>
-                    <a:bodyPr/>
-                    <a:lstStyle/>
-                    <a:p>
-                      <a:pPr algn="l" fontAlgn="b"/>
-                      <a:r>
-                        <a:rPr lang="en-US" sz="2400" b="0" i="0" u="none" strike="noStrike">
-                          <a:solidFill>
-                            <a:srgbClr val="000000"/>
-                          </a:solidFill>
-                          <a:effectLst/>
-                          <a:latin typeface="Calibri"/>
-                        </a:rPr>
-                        <a:t>Discharge Date</a:t>
-                      </a:r>
-                    </a:p>
-                  </a:txBody>
-                  <a:tcPr marL="12700" marR="12700" marT="12700" marB="0" anchor="b">
-                    <a:lnL>
-                      <a:noFill/>
-                    </a:lnL>
-                    <a:lnR>
-                      <a:noFill/>
-                    </a:lnR>
-                    <a:lnT>
-                      <a:noFill/>
-                    </a:lnT>
-                    <a:lnB>
-                      <a:noFill/>
-                    </a:lnB>
-                  </a:tcPr>
-                </a:tc>
-              </a:tr>
-              <a:tr h="441744">
-                <a:tc>
-                  <a:txBody>
-                    <a:bodyPr/>
-                    <a:lstStyle/>
-                    <a:p>
-                      <a:pPr marL="0" marR="0" indent="0" algn="l" defTabSz="457200" rtl="0" eaLnBrk="1" fontAlgn="b" latinLnBrk="0" hangingPunct="1">
-                        <a:lnSpc>
-                          <a:spcPct val="100000"/>
-                        </a:lnSpc>
-                        <a:spcBef>
-                          <a:spcPts val="0"/>
-                        </a:spcBef>
-                        <a:spcAft>
-                          <a:spcPts val="0"/>
-                        </a:spcAft>
-                        <a:buClrTx/>
-                        <a:buSzTx/>
-                        <a:buFontTx/>
-                        <a:buNone/>
-                        <a:tabLst/>
-                        <a:defRPr/>
-                      </a:pPr>
-                      <a:r>
-                        <a:rPr lang="en-US" sz="2400" b="0" i="0" u="none" strike="noStrike" dirty="0" smtClean="0">
-                          <a:solidFill>
-                            <a:srgbClr val="000000"/>
-                          </a:solidFill>
-                          <a:effectLst/>
-                          <a:latin typeface="+mn-lt"/>
-                        </a:rPr>
-                        <a:t>Intake date</a:t>
-                      </a:r>
-                    </a:p>
-                  </a:txBody>
-                  <a:tcPr marL="12700" marR="12700" marT="12700" marB="0" anchor="b">
-                    <a:lnL>
-                      <a:noFill/>
-                    </a:lnL>
-                    <a:lnR>
-                      <a:noFill/>
-                    </a:lnR>
-                    <a:lnT>
-                      <a:noFill/>
-                    </a:lnT>
-                    <a:lnB>
-                      <a:noFill/>
-                    </a:lnB>
-                  </a:tcPr>
-                </a:tc>
-              </a:tr>
-              <a:tr h="441744">
-                <a:tc>
-                  <a:txBody>
-                    <a:bodyPr/>
-                    <a:lstStyle/>
-                    <a:p>
-                      <a:pPr algn="l" fontAlgn="b"/>
-                      <a:r>
-                        <a:rPr lang="en-US" sz="2400" b="0" i="0" u="none" strike="noStrike" dirty="0" smtClean="0">
-                          <a:solidFill>
-                            <a:srgbClr val="000000"/>
-                          </a:solidFill>
-                          <a:effectLst/>
-                          <a:latin typeface="Calibri"/>
-                        </a:rPr>
-                        <a:t>PCP</a:t>
-                      </a:r>
-                      <a:endParaRPr lang="en-US" sz="2400" b="0" i="0" u="none" strike="noStrike" dirty="0">
-                        <a:solidFill>
-                          <a:srgbClr val="000000"/>
-                        </a:solidFill>
-                        <a:effectLst/>
-                        <a:latin typeface="Calibri"/>
-                      </a:endParaRPr>
-                    </a:p>
-                  </a:txBody>
-                  <a:tcPr marL="12700" marR="12700" marT="12700" marB="0" anchor="b">
-                    <a:lnL>
-                      <a:noFill/>
-                    </a:lnL>
-                    <a:lnR>
-                      <a:noFill/>
-                    </a:lnR>
-                    <a:lnT>
-                      <a:noFill/>
-                    </a:lnT>
-                    <a:lnB>
-                      <a:noFill/>
-                    </a:lnB>
-                  </a:tcPr>
-                </a:tc>
-              </a:tr>
-            </a:tbl>
-          </a:graphicData>
-        </a:graphic>
-      </p:graphicFrame>
-      <p:sp>
-        <p:nvSpPr>
-          <p:cNvPr id="3" name="Title 2"/>
-          <p:cNvSpPr>
-            <a:spLocks noGrp="1"/>
-          </p:cNvSpPr>
-          <p:nvPr>
-            <p:ph type="title"/>
-          </p:nvPr>
-        </p:nvSpPr>
-        <p:spPr/>
-        <p:txBody>
-          <a:bodyPr>
-            <a:normAutofit/>
-          </a:bodyPr>
-          <a:lstStyle/>
-          <a:p>
-            <a:r>
-              <a:rPr lang="en-US" dirty="0" smtClean="0"/>
-              <a:t>Data</a:t>
-            </a:r>
-            <a:endParaRPr lang="en-US" dirty="0"/>
-          </a:p>
-        </p:txBody>
-      </p:sp>
-      <p:graphicFrame>
-        <p:nvGraphicFramePr>
-          <p:cNvPr id="5" name="Table 4"/>
-          <p:cNvGraphicFramePr>
-            <a:graphicFrameLocks noGrp="1"/>
-          </p:cNvGraphicFramePr>
-          <p:nvPr>
-            <p:extLst>
-              <p:ext uri="{D42A27DB-BD31-4B8C-83A1-F6EECF244321}">
-                <p14:modId xmlns:p14="http://schemas.microsoft.com/office/powerpoint/2010/main" val="2015915944"/>
-              </p:ext>
-            </p:extLst>
-          </p:nvPr>
-        </p:nvGraphicFramePr>
-        <p:xfrm>
-          <a:off x="440989" y="1605350"/>
-          <a:ext cx="1993291" cy="3939208"/>
-        </p:xfrm>
-        <a:graphic>
-          <a:graphicData uri="http://schemas.openxmlformats.org/drawingml/2006/table">
-            <a:tbl>
-              <a:tblPr/>
-              <a:tblGrid>
-                <a:gridCol w="1993291"/>
-              </a:tblGrid>
-              <a:tr h="492401">
-                <a:tc>
-                  <a:txBody>
-                    <a:bodyPr/>
-                    <a:lstStyle/>
-                    <a:p>
-                      <a:pPr marL="0" marR="0" indent="0" algn="l" defTabSz="457200" rtl="0" eaLnBrk="1" fontAlgn="b" latinLnBrk="0" hangingPunct="1">
-                        <a:lnSpc>
-                          <a:spcPct val="100000"/>
-                        </a:lnSpc>
-                        <a:spcBef>
-                          <a:spcPts val="0"/>
-                        </a:spcBef>
-                        <a:spcAft>
-                          <a:spcPts val="0"/>
-                        </a:spcAft>
-                        <a:buClrTx/>
-                        <a:buSzTx/>
-                        <a:buFontTx/>
-                        <a:buNone/>
-                        <a:tabLst/>
-                        <a:defRPr/>
-                      </a:pPr>
-                      <a:r>
-                        <a:rPr lang="en-US" sz="2400" b="0" i="0" u="none" strike="noStrike" dirty="0" err="1" smtClean="0">
-                          <a:solidFill>
-                            <a:srgbClr val="000000"/>
-                          </a:solidFill>
-                          <a:effectLst/>
-                          <a:latin typeface="+mn-lt"/>
-                        </a:rPr>
-                        <a:t>PatientID</a:t>
-                      </a:r>
-                      <a:endParaRPr lang="en-US" sz="2400" b="0" i="0" u="none" strike="noStrike" dirty="0" smtClean="0">
-                        <a:solidFill>
-                          <a:srgbClr val="000000"/>
-                        </a:solidFill>
-                        <a:effectLst/>
-                        <a:latin typeface="+mn-lt"/>
-                      </a:endParaRPr>
-                    </a:p>
-                  </a:txBody>
-                  <a:tcPr marL="12700" marR="12700" marT="12700" marB="0" anchor="b">
-                    <a:lnL>
-                      <a:noFill/>
-                    </a:lnL>
-                    <a:lnR>
-                      <a:noFill/>
-                    </a:lnR>
-                    <a:lnT>
-                      <a:noFill/>
-                    </a:lnT>
-                    <a:lnB>
-                      <a:noFill/>
-                    </a:lnB>
-                  </a:tcPr>
-                </a:tc>
-              </a:tr>
-              <a:tr h="492401">
-                <a:tc>
-                  <a:txBody>
-                    <a:bodyPr/>
-                    <a:lstStyle/>
-                    <a:p>
-                      <a:pPr algn="l" fontAlgn="b"/>
-                      <a:r>
-                        <a:rPr lang="en-US" sz="2400" b="0" i="0" u="none" strike="noStrike" dirty="0" smtClean="0">
-                          <a:solidFill>
-                            <a:srgbClr val="000000"/>
-                          </a:solidFill>
-                          <a:effectLst/>
-                          <a:latin typeface="Calibri"/>
-                        </a:rPr>
-                        <a:t>Name</a:t>
-                      </a:r>
-                    </a:p>
-                  </a:txBody>
-                  <a:tcPr marL="12700" marR="12700" marT="12700" marB="0" anchor="b">
-                    <a:lnL>
-                      <a:noFill/>
-                    </a:lnL>
-                    <a:lnR>
-                      <a:noFill/>
-                    </a:lnR>
-                    <a:lnT>
-                      <a:noFill/>
-                    </a:lnT>
-                    <a:lnB>
-                      <a:noFill/>
-                    </a:lnB>
-                  </a:tcPr>
-                </a:tc>
-              </a:tr>
-              <a:tr h="492401">
-                <a:tc>
-                  <a:txBody>
-                    <a:bodyPr/>
-                    <a:lstStyle/>
-                    <a:p>
-                      <a:pPr algn="l" fontAlgn="b"/>
-                      <a:r>
-                        <a:rPr lang="en-US" sz="2400" b="0" i="0" u="none" strike="noStrike" dirty="0" smtClean="0">
-                          <a:solidFill>
-                            <a:srgbClr val="000000"/>
-                          </a:solidFill>
-                          <a:effectLst/>
-                          <a:latin typeface="Calibri"/>
-                        </a:rPr>
-                        <a:t>DOB</a:t>
-                      </a:r>
-                      <a:endParaRPr lang="en-US" sz="2400" b="0" i="0" u="none" strike="noStrike" dirty="0">
-                        <a:solidFill>
-                          <a:srgbClr val="000000"/>
-                        </a:solidFill>
-                        <a:effectLst/>
-                        <a:latin typeface="Calibri"/>
-                      </a:endParaRPr>
-                    </a:p>
-                  </a:txBody>
-                  <a:tcPr marL="12700" marR="12700" marT="12700" marB="0" anchor="b">
-                    <a:lnL>
-                      <a:noFill/>
-                    </a:lnL>
-                    <a:lnR>
-                      <a:noFill/>
-                    </a:lnR>
-                    <a:lnT>
-                      <a:noFill/>
-                    </a:lnT>
-                    <a:lnB>
-                      <a:noFill/>
-                    </a:lnB>
-                  </a:tcPr>
-                </a:tc>
-              </a:tr>
-              <a:tr h="492401">
-                <a:tc>
-                  <a:txBody>
-                    <a:bodyPr/>
-                    <a:lstStyle/>
-                    <a:p>
-                      <a:pPr algn="l" fontAlgn="b"/>
-                      <a:r>
-                        <a:rPr lang="en-US" sz="2400" b="0" i="0" u="none" strike="noStrike">
-                          <a:solidFill>
-                            <a:srgbClr val="000000"/>
-                          </a:solidFill>
-                          <a:effectLst/>
-                          <a:latin typeface="Calibri"/>
-                        </a:rPr>
-                        <a:t>Gender</a:t>
-                      </a:r>
-                    </a:p>
-                  </a:txBody>
-                  <a:tcPr marL="12700" marR="12700" marT="12700" marB="0" anchor="b">
-                    <a:lnL>
-                      <a:noFill/>
-                    </a:lnL>
-                    <a:lnR>
-                      <a:noFill/>
-                    </a:lnR>
-                    <a:lnT>
-                      <a:noFill/>
-                    </a:lnT>
-                    <a:lnB>
-                      <a:noFill/>
-                    </a:lnB>
-                  </a:tcPr>
-                </a:tc>
-              </a:tr>
-              <a:tr h="492401">
-                <a:tc>
-                  <a:txBody>
-                    <a:bodyPr/>
-                    <a:lstStyle/>
-                    <a:p>
-                      <a:pPr algn="l" fontAlgn="b"/>
-                      <a:r>
-                        <a:rPr lang="en-US" sz="2400" b="0" i="0" u="none" strike="noStrike" dirty="0">
-                          <a:solidFill>
-                            <a:srgbClr val="000000"/>
-                          </a:solidFill>
-                          <a:effectLst/>
-                          <a:latin typeface="Calibri"/>
-                        </a:rPr>
-                        <a:t>Ethnicity</a:t>
-                      </a:r>
-                    </a:p>
-                  </a:txBody>
-                  <a:tcPr marL="12700" marR="12700" marT="12700" marB="0" anchor="b">
-                    <a:lnL>
-                      <a:noFill/>
-                    </a:lnL>
-                    <a:lnR>
-                      <a:noFill/>
-                    </a:lnR>
-                    <a:lnT>
-                      <a:noFill/>
-                    </a:lnT>
-                    <a:lnB>
-                      <a:noFill/>
-                    </a:lnB>
-                  </a:tcPr>
-                </a:tc>
-              </a:tr>
-              <a:tr h="492401">
-                <a:tc>
-                  <a:txBody>
-                    <a:bodyPr/>
-                    <a:lstStyle/>
-                    <a:p>
-                      <a:pPr algn="l" fontAlgn="b"/>
-                      <a:r>
-                        <a:rPr lang="en-US" sz="2400" b="0" i="0" u="none" strike="noStrike" dirty="0">
-                          <a:solidFill>
-                            <a:srgbClr val="000000"/>
-                          </a:solidFill>
-                          <a:effectLst/>
-                          <a:latin typeface="Calibri"/>
-                        </a:rPr>
-                        <a:t>Address</a:t>
-                      </a:r>
-                    </a:p>
-                  </a:txBody>
-                  <a:tcPr marL="12700" marR="12700" marT="12700" marB="0" anchor="b">
-                    <a:lnL>
-                      <a:noFill/>
-                    </a:lnL>
-                    <a:lnR>
-                      <a:noFill/>
-                    </a:lnR>
-                    <a:lnT>
-                      <a:noFill/>
-                    </a:lnT>
-                    <a:lnB>
-                      <a:noFill/>
-                    </a:lnB>
-                  </a:tcPr>
-                </a:tc>
-              </a:tr>
-              <a:tr h="492401">
-                <a:tc>
-                  <a:txBody>
-                    <a:bodyPr/>
-                    <a:lstStyle/>
-                    <a:p>
-                      <a:pPr algn="l" fontAlgn="b"/>
-                      <a:r>
-                        <a:rPr lang="en-US" sz="2400" b="0" i="0" u="none" strike="noStrike" dirty="0">
-                          <a:solidFill>
-                            <a:srgbClr val="000000"/>
-                          </a:solidFill>
-                          <a:effectLst/>
-                          <a:latin typeface="Calibri"/>
-                        </a:rPr>
-                        <a:t>City</a:t>
-                      </a:r>
-                    </a:p>
-                  </a:txBody>
-                  <a:tcPr marL="12700" marR="12700" marT="12700" marB="0" anchor="b">
-                    <a:lnL>
-                      <a:noFill/>
-                    </a:lnL>
-                    <a:lnR>
-                      <a:noFill/>
-                    </a:lnR>
-                    <a:lnT>
-                      <a:noFill/>
-                    </a:lnT>
-                    <a:lnB>
-                      <a:noFill/>
-                    </a:lnB>
-                  </a:tcPr>
-                </a:tc>
-              </a:tr>
-              <a:tr h="492401">
-                <a:tc>
-                  <a:txBody>
-                    <a:bodyPr/>
-                    <a:lstStyle/>
-                    <a:p>
-                      <a:pPr algn="l" fontAlgn="b"/>
-                      <a:r>
-                        <a:rPr lang="en-US" sz="2400" b="0" i="0" u="none" strike="noStrike" dirty="0" smtClean="0">
-                          <a:solidFill>
-                            <a:srgbClr val="000000"/>
-                          </a:solidFill>
-                          <a:effectLst/>
-                          <a:latin typeface="Calibri"/>
-                        </a:rPr>
-                        <a:t>State</a:t>
-                      </a:r>
-                    </a:p>
-                  </a:txBody>
-                  <a:tcPr marL="12700" marR="12700" marT="12700" marB="0" anchor="b">
-                    <a:lnL>
-                      <a:noFill/>
-                    </a:lnL>
-                    <a:lnR>
-                      <a:noFill/>
-                    </a:lnR>
-                    <a:lnT>
-                      <a:noFill/>
-                    </a:lnT>
-                    <a:lnB>
-                      <a:noFill/>
-                    </a:lnB>
-                  </a:tcPr>
-                </a:tc>
-              </a:tr>
-            </a:tbl>
-          </a:graphicData>
-        </a:graphic>
-      </p:graphicFrame>
-    </p:spTree>
-    <p:extLst>
-      <p:ext uri="{BB962C8B-B14F-4D97-AF65-F5344CB8AC3E}">
-        <p14:creationId xmlns:p14="http://schemas.microsoft.com/office/powerpoint/2010/main" val="2621489605"/>
-      </p:ext>
-    </p:extLst>
-  </p:cSld>
-  <p:clrMapOvr>
-    <a:masterClrMapping/>
-  </p:clrMapOvr>
-  <p:timing>
-    <p:tnLst>
-      <p:par>
-        <p:cTn id="1" dur="indefinite" restart="never" nodeType="tmRoot"/>
-      </p:par>
-    </p:tnLst>
-  </p:timing>
-</p:sld>
-</file>
-
-<file path=ppt/slides/slide6.xml><?xml version="1.0" encoding="utf-8"?>
-<p:sld xmlns:a="http://schemas.openxmlformats.org/drawingml/2006/main" xmlns:r="http://schemas.openxmlformats.org/officeDocument/2006/relationships" xmlns:p="http://schemas.openxmlformats.org/presentationml/2006/main">
-  <p:cSld>
-    <p:spTree>
-      <p:nvGrpSpPr>
-        <p:cNvPr id="1" name=""/>
-        <p:cNvGrpSpPr/>
-        <p:nvPr/>
-      </p:nvGrpSpPr>
-      <p:grpSpPr>
-        <a:xfrm>
-          <a:off x="0" y="0"/>
-          <a:ext cx="0" cy="0"/>
-          <a:chOff x="0" y="0"/>
-          <a:chExt cx="0" cy="0"/>
-        </a:xfrm>
-      </p:grpSpPr>
       <p:sp>
         <p:nvSpPr>
           <p:cNvPr id="2" name="Content Placeholder 1"/>
@@ -10902,13 +10101,13 @@
         <p:spPr/>
         <p:txBody>
           <a:bodyPr>
-            <a:normAutofit/>
+            <a:normAutofit lnSpcReduction="10000"/>
           </a:bodyPr>
           <a:lstStyle/>
           <a:p>
             <a:r>
               <a:rPr lang="en-US" dirty="0" smtClean="0"/>
-              <a:t>Categorical to Binary</a:t>
+              <a:t>Categorical to Binary (Dummies)</a:t>
             </a:r>
           </a:p>
           <a:p>
@@ -10932,7 +10131,7 @@
           <a:p>
             <a:r>
               <a:rPr lang="en-US" dirty="0" smtClean="0"/>
-              <a:t>Scaling</a:t>
+              <a:t>Scaling/Normalizing</a:t>
             </a:r>
           </a:p>
           <a:p>
@@ -10943,9 +10142,24 @@
           </a:p>
           <a:p>
             <a:r>
-              <a:rPr lang="en-US" b="1" dirty="0" smtClean="0"/>
-              <a:t>Aggregations</a:t>
-            </a:r>
+              <a:rPr lang="en-US" dirty="0" smtClean="0"/>
+              <a:t>Aggregations (space, time, space and time)</a:t>
+            </a:r>
+          </a:p>
+          <a:p>
+            <a:r>
+              <a:rPr lang="en-US" dirty="0" smtClean="0"/>
+              <a:t>Relative (compared to the average</a:t>
+            </a:r>
+            <a:r>
+              <a:rPr lang="mr-IN" dirty="0" smtClean="0"/>
+              <a:t>…</a:t>
+            </a:r>
+            <a:r>
+              <a:rPr lang="en-US" dirty="0" smtClean="0"/>
+              <a:t>)</a:t>
+            </a:r>
+            <a:endParaRPr lang="en-US" dirty="0" smtClean="0"/>
           </a:p>
           <a:p>
             <a:r>
@@ -10991,7 +10205,7 @@
 </p:sld>
 </file>
 
-<file path=ppt/slides/slide7.xml><?xml version="1.0" encoding="utf-8"?>
+<file path=ppt/slides/slide6.xml><?xml version="1.0" encoding="utf-8"?>
 <p:sld xmlns:a="http://schemas.openxmlformats.org/drawingml/2006/main" xmlns:r="http://schemas.openxmlformats.org/officeDocument/2006/relationships" xmlns:p="http://schemas.openxmlformats.org/presentationml/2006/main">
   <p:cSld>
     <p:spTree>
@@ -11069,6 +10283,94 @@
 </p:sld>
 </file>
 
+<file path=ppt/slides/slide7.xml><?xml version="1.0" encoding="utf-8"?>
+<p:sld xmlns:a="http://schemas.openxmlformats.org/drawingml/2006/main" xmlns:r="http://schemas.openxmlformats.org/officeDocument/2006/relationships" xmlns:p="http://schemas.openxmlformats.org/presentationml/2006/main">
+  <p:cSld>
+    <p:spTree>
+      <p:nvGrpSpPr>
+        <p:cNvPr id="1" name=""/>
+        <p:cNvGrpSpPr/>
+        <p:nvPr/>
+      </p:nvGrpSpPr>
+      <p:grpSpPr>
+        <a:xfrm>
+          <a:off x="0" y="0"/>
+          <a:ext cx="0" cy="0"/>
+          <a:chOff x="0" y="0"/>
+          <a:chExt cx="0" cy="0"/>
+        </a:xfrm>
+      </p:grpSpPr>
+      <p:sp>
+        <p:nvSpPr>
+          <p:cNvPr id="2" name="Content Placeholder 1"/>
+          <p:cNvSpPr>
+            <a:spLocks noGrp="1"/>
+          </p:cNvSpPr>
+          <p:nvPr>
+            <p:ph idx="1"/>
+          </p:nvPr>
+        </p:nvSpPr>
+        <p:spPr/>
+        <p:txBody>
+          <a:bodyPr/>
+          <a:lstStyle/>
+          <a:p>
+            <a:r>
+              <a:rPr lang="en-US" dirty="0" smtClean="0"/>
+              <a:t>One vs All (Dummy Variables)</a:t>
+            </a:r>
+          </a:p>
+          <a:p>
+            <a:r>
+              <a:rPr lang="en-US" dirty="0" smtClean="0"/>
+              <a:t>Groups</a:t>
+            </a:r>
+          </a:p>
+          <a:p>
+            <a:r>
+              <a:rPr lang="en-US" dirty="0" smtClean="0"/>
+              <a:t>Presence Vs Absence</a:t>
+            </a:r>
+            <a:endParaRPr lang="en-US" dirty="0"/>
+          </a:p>
+        </p:txBody>
+      </p:sp>
+      <p:sp>
+        <p:nvSpPr>
+          <p:cNvPr id="3" name="Title 2"/>
+          <p:cNvSpPr>
+            <a:spLocks noGrp="1"/>
+          </p:cNvSpPr>
+          <p:nvPr>
+            <p:ph type="title"/>
+          </p:nvPr>
+        </p:nvSpPr>
+        <p:spPr/>
+        <p:txBody>
+          <a:bodyPr/>
+          <a:lstStyle/>
+          <a:p>
+            <a:r>
+              <a:rPr lang="en-US" dirty="0" smtClean="0"/>
+              <a:t>Categorical to Binary</a:t>
+            </a:r>
+            <a:endParaRPr lang="en-US" dirty="0"/>
+          </a:p>
+        </p:txBody>
+      </p:sp>
+    </p:spTree>
+    <p:extLst>
+      <p:ext uri="{BB962C8B-B14F-4D97-AF65-F5344CB8AC3E}">
+        <p14:creationId xmlns:p14="http://schemas.microsoft.com/office/powerpoint/2010/main" val="1319355281"/>
+      </p:ext>
+    </p:extLst>
+  </p:cSld>
+  <p:clrMapOvr>
+    <a:masterClrMapping/>
+  </p:clrMapOvr>
+</p:sld>
+</file>
+
 <file path=ppt/slides/slide8.xml><?xml version="1.0" encoding="utf-8"?>
 <p:sld xmlns:a="http://schemas.openxmlformats.org/drawingml/2006/main" xmlns:r="http://schemas.openxmlformats.org/officeDocument/2006/relationships" xmlns:p="http://schemas.openxmlformats.org/presentationml/2006/main">
   <p:cSld>
@@ -11103,23 +10405,32 @@
           <a:p>
             <a:r>
               <a:rPr lang="en-US" dirty="0" smtClean="0"/>
-              <a:t>One vs All (Dummy Variables)</a:t>
-            </a:r>
-          </a:p>
-          <a:p>
+              <a:t>Impute (Fill in) missing values based on why you think they may be missing and what you want the model to do with those missing values</a:t>
+            </a:r>
+          </a:p>
+          <a:p>
+            <a:pPr lvl="1"/>
             <a:r>
               <a:rPr lang="en-US" dirty="0" smtClean="0"/>
-              <a:t>Groups</a:t>
-            </a:r>
+              <a:t>Mean/median/mode</a:t>
+            </a:r>
+          </a:p>
+          <a:p>
+            <a:pPr lvl="1"/>
+            <a:endParaRPr lang="en-US" dirty="0"/>
           </a:p>
           <a:p>
             <a:r>
               <a:rPr lang="en-US" dirty="0" smtClean="0"/>
-              <a:t>Presence Vs </a:t>
+              <a:t>Typically, also add binary feature (dummy) for missing vs not missing in case “</a:t>
             </a:r>
             <a:r>
               <a:rPr lang="en-US" dirty="0" err="1" smtClean="0"/>
-              <a:t>Absense</a:t>
+              <a:t>missingness</a:t>
+            </a:r>
+            <a:r>
+              <a:rPr lang="en-US" dirty="0" smtClean="0"/>
+              <a:t>” is predictive of the outcome</a:t>
             </a:r>
             <a:endParaRPr lang="en-US" dirty="0"/>
           </a:p>
@@ -11142,7 +10453,7 @@
           <a:p>
             <a:r>
               <a:rPr lang="en-US" dirty="0" smtClean="0"/>
-              <a:t>Categorical to Binary</a:t>
+              <a:t>Missing Values</a:t>
             </a:r>
             <a:endParaRPr lang="en-US" dirty="0"/>
           </a:p>
@@ -11151,7 +10462,7 @@
     </p:spTree>
     <p:extLst>
       <p:ext uri="{BB962C8B-B14F-4D97-AF65-F5344CB8AC3E}">
-        <p14:creationId xmlns:p14="http://schemas.microsoft.com/office/powerpoint/2010/main" val="1319355281"/>
+        <p14:creationId xmlns:p14="http://schemas.microsoft.com/office/powerpoint/2010/main" val="1145092105"/>
       </p:ext>
     </p:extLst>
   </p:cSld>
@@ -11195,65 +10506,26 @@
           <a:p>
             <a:r>
               <a:rPr lang="en-US" dirty="0" smtClean="0"/>
-              <a:t>Impute (Fill in) missing values based on </a:t>
-            </a:r>
-            <a:r>
-              <a:rPr lang="en-US" dirty="0" err="1" smtClean="0"/>
-              <a:t>whay</a:t>
-            </a:r>
+              <a:t>Equal width bins</a:t>
+            </a:r>
+          </a:p>
+          <a:p>
             <a:r>
               <a:rPr lang="en-US" dirty="0" smtClean="0"/>
-              <a:t> you think they may be missing and what you want the model to do with those missing values</a:t>
-            </a:r>
-          </a:p>
-          <a:p>
-            <a:pPr lvl="1"/>
+              <a:t>Equal size bins</a:t>
+            </a:r>
+          </a:p>
+          <a:p>
             <a:r>
               <a:rPr lang="en-US" dirty="0" smtClean="0"/>
-              <a:t>Mean/median/mode</a:t>
-            </a:r>
-          </a:p>
-          <a:p>
-            <a:pPr lvl="1"/>
+              <a:t>Entropy-based bins</a:t>
+            </a:r>
+          </a:p>
+          <a:p>
             <a:r>
               <a:rPr lang="en-US" dirty="0" smtClean="0"/>
-              <a:t>Class-conditional</a:t>
-            </a:r>
-          </a:p>
-          <a:p>
-            <a:pPr lvl="1"/>
-            <a:endParaRPr lang="en-US" dirty="0"/>
-          </a:p>
-          <a:p>
-            <a:r>
-              <a:rPr lang="en-US" dirty="0" smtClean="0"/>
-              <a:t>Typically, also add </a:t>
-            </a:r>
-            <a:r>
-              <a:rPr lang="en-US" dirty="0" smtClean="0"/>
-              <a:t>binary </a:t>
-            </a:r>
-            <a:r>
-              <a:rPr lang="en-US" dirty="0" smtClean="0"/>
-              <a:t>feature (dummy) </a:t>
-            </a:r>
-            <a:r>
-              <a:rPr lang="en-US" dirty="0" smtClean="0"/>
-              <a:t>for missing vs not </a:t>
-            </a:r>
-            <a:r>
-              <a:rPr lang="en-US" dirty="0" smtClean="0"/>
-              <a:t>missing in case “</a:t>
-            </a:r>
-            <a:r>
-              <a:rPr lang="en-US" dirty="0" err="1" smtClean="0"/>
-              <a:t>missingness</a:t>
-            </a:r>
-            <a:r>
-              <a:rPr lang="en-US" dirty="0" smtClean="0"/>
-              <a:t>” is predictive of the outcome</a:t>
-            </a:r>
-            <a:endParaRPr lang="en-US" dirty="0"/>
+              <a:t>Domain-Specific bins (infant, KG, Elementary school age, middle school age, etc.)</a:t>
+            </a:r>
           </a:p>
         </p:txBody>
       </p:sp>
@@ -11274,7 +10546,7 @@
           <a:p>
             <a:r>
               <a:rPr lang="en-US" dirty="0" smtClean="0"/>
-              <a:t>Missing Values</a:t>
+              <a:t>Discretization</a:t>
             </a:r>
             <a:endParaRPr lang="en-US" dirty="0"/>
           </a:p>
@@ -11283,7 +10555,7 @@
     </p:spTree>
     <p:extLst>
       <p:ext uri="{BB962C8B-B14F-4D97-AF65-F5344CB8AC3E}">
-        <p14:creationId xmlns:p14="http://schemas.microsoft.com/office/powerpoint/2010/main" val="1145092105"/>
+        <p14:creationId xmlns:p14="http://schemas.microsoft.com/office/powerpoint/2010/main" val="1878538625"/>
       </p:ext>
     </p:extLst>
   </p:cSld>

</xml_diff>